<commit_message>
Eliminar referencias a cpp
</commit_message>
<xml_diff>
--- a/PPTs/FP08.pptx
+++ b/PPTs/FP08.pptx
@@ -151,7 +151,7 @@
 <file path=ppt/revisionInfo.xml><?xml version="1.0" encoding="utf-8"?>
 <p1510:revInfo xmlns:a="http://schemas.openxmlformats.org/drawingml/2006/main" xmlns:r="http://schemas.openxmlformats.org/officeDocument/2006/relationships" xmlns:p1510="http://schemas.microsoft.com/office/powerpoint/2015/10/main">
   <p1510:revLst>
-    <p1510:client id="{F8A738AE-7528-446C-B1D1-17EB89217014}" v="1" dt="2020-02-23T15:53:39.445"/>
+    <p1510:client id="{A959D5FE-3EDB-4E12-BBAE-34B142CE3F84}" v="88" dt="2021-11-14T19:16:14.507"/>
   </p1510:revLst>
 </p1510:revInfo>
 </file>
@@ -694,6 +694,30 @@
       </pc:sldChg>
     </pc:docChg>
   </pc:docChgLst>
+  <pc:docChgLst>
+    <pc:chgData name="Miguel Ángel Campos Méndez" userId="402d5bdf62ce6c12" providerId="LiveId" clId="{A959D5FE-3EDB-4E12-BBAE-34B142CE3F84}"/>
+    <pc:docChg chg="modSld">
+      <pc:chgData name="Miguel Ángel Campos Méndez" userId="402d5bdf62ce6c12" providerId="LiveId" clId="{A959D5FE-3EDB-4E12-BBAE-34B142CE3F84}" dt="2021-11-14T19:16:14.507" v="87" actId="20577"/>
+      <pc:docMkLst>
+        <pc:docMk/>
+      </pc:docMkLst>
+      <pc:sldChg chg="modSp modAnim">
+        <pc:chgData name="Miguel Ángel Campos Méndez" userId="402d5bdf62ce6c12" providerId="LiveId" clId="{A959D5FE-3EDB-4E12-BBAE-34B142CE3F84}" dt="2021-11-14T19:16:14.507" v="87" actId="20577"/>
+        <pc:sldMkLst>
+          <pc:docMk/>
+          <pc:sldMk cId="0" sldId="1025"/>
+        </pc:sldMkLst>
+        <pc:spChg chg="mod">
+          <ac:chgData name="Miguel Ángel Campos Méndez" userId="402d5bdf62ce6c12" providerId="LiveId" clId="{A959D5FE-3EDB-4E12-BBAE-34B142CE3F84}" dt="2021-11-14T19:16:14.507" v="87" actId="20577"/>
+          <ac:spMkLst>
+            <pc:docMk/>
+            <pc:sldMk cId="0" sldId="1025"/>
+            <ac:spMk id="3" creationId="{00000000-0000-0000-0000-000000000000}"/>
+          </ac:spMkLst>
+        </pc:spChg>
+      </pc:sldChg>
+    </pc:docChg>
+  </pc:docChgLst>
 </pc:chgInfo>
 </file>
 
@@ -780,7 +804,7 @@
             <a:fld id="{8C8F6882-623C-4F59-89C4-4E5CBDBBE090}" type="datetimeFigureOut">
               <a:rPr lang="es-ES" smtClean="0"/>
               <a:pPr/>
-              <a:t>23/02/2020</a:t>
+              <a:t>14/11/2021</a:t>
             </a:fld>
             <a:endParaRPr lang="es-ES"/>
           </a:p>
@@ -947,7 +971,7 @@
             <a:fld id="{ECD25255-EE5E-40E3-B634-65B4AA002A7D}" type="datetimeFigureOut">
               <a:rPr lang="es-ES" smtClean="0"/>
               <a:pPr/>
-              <a:t>23/02/2020</a:t>
+              <a:t>14/11/2021</a:t>
             </a:fld>
             <a:endParaRPr lang="es-ES"/>
           </a:p>
@@ -1394,7 +1418,7 @@
             <a:fld id="{47C9B81F-C347-4BEF-BFDF-29C42F48304A}" type="datetimeFigureOut">
               <a:rPr lang="en-US" smtClean="0"/>
               <a:pPr/>
-              <a:t>2/23/2020</a:t>
+              <a:t>11/14/2021</a:t>
             </a:fld>
             <a:endParaRPr lang="en-US"/>
           </a:p>
@@ -1564,7 +1588,7 @@
             <a:fld id="{47C9B81F-C347-4BEF-BFDF-29C42F48304A}" type="datetimeFigureOut">
               <a:rPr lang="en-US" smtClean="0"/>
               <a:pPr/>
-              <a:t>2/23/2020</a:t>
+              <a:t>11/14/2021</a:t>
             </a:fld>
             <a:endParaRPr lang="en-US"/>
           </a:p>
@@ -1744,7 +1768,7 @@
             <a:fld id="{47C9B81F-C347-4BEF-BFDF-29C42F48304A}" type="datetimeFigureOut">
               <a:rPr lang="en-US" smtClean="0"/>
               <a:pPr/>
-              <a:t>2/23/2020</a:t>
+              <a:t>11/14/2021</a:t>
             </a:fld>
             <a:endParaRPr lang="en-US"/>
           </a:p>
@@ -2466,7 +2490,7 @@
             <a:fld id="{47C9B81F-C347-4BEF-BFDF-29C42F48304A}" type="datetimeFigureOut">
               <a:rPr lang="en-US" smtClean="0"/>
               <a:pPr/>
-              <a:t>2/23/2020</a:t>
+              <a:t>11/14/2021</a:t>
             </a:fld>
             <a:endParaRPr lang="en-US"/>
           </a:p>
@@ -2735,7 +2759,7 @@
             <a:fld id="{47C9B81F-C347-4BEF-BFDF-29C42F48304A}" type="datetimeFigureOut">
               <a:rPr lang="en-US" smtClean="0"/>
               <a:pPr/>
-              <a:t>2/23/2020</a:t>
+              <a:t>11/14/2021</a:t>
             </a:fld>
             <a:endParaRPr lang="en-US"/>
           </a:p>
@@ -3118,7 +3142,7 @@
             <a:fld id="{47C9B81F-C347-4BEF-BFDF-29C42F48304A}" type="datetimeFigureOut">
               <a:rPr lang="en-US" smtClean="0"/>
               <a:pPr/>
-              <a:t>2/23/2020</a:t>
+              <a:t>11/14/2021</a:t>
             </a:fld>
             <a:endParaRPr lang="en-US"/>
           </a:p>
@@ -3273,7 +3297,7 @@
             <a:fld id="{47C9B81F-C347-4BEF-BFDF-29C42F48304A}" type="datetimeFigureOut">
               <a:rPr lang="en-US" smtClean="0"/>
               <a:pPr/>
-              <a:t>2/23/2020</a:t>
+              <a:t>11/14/2021</a:t>
             </a:fld>
             <a:endParaRPr lang="en-US"/>
           </a:p>
@@ -3368,7 +3392,7 @@
             <a:fld id="{47C9B81F-C347-4BEF-BFDF-29C42F48304A}" type="datetimeFigureOut">
               <a:rPr lang="en-US" smtClean="0"/>
               <a:pPr/>
-              <a:t>2/23/2020</a:t>
+              <a:t>11/14/2021</a:t>
             </a:fld>
             <a:endParaRPr lang="en-US"/>
           </a:p>
@@ -3634,7 +3658,7 @@
             <a:fld id="{47C9B81F-C347-4BEF-BFDF-29C42F48304A}" type="datetimeFigureOut">
               <a:rPr lang="en-US" smtClean="0"/>
               <a:pPr/>
-              <a:t>2/23/2020</a:t>
+              <a:t>11/14/2021</a:t>
             </a:fld>
             <a:endParaRPr lang="en-US"/>
           </a:p>
@@ -3927,7 +3951,7 @@
             <a:fld id="{47C9B81F-C347-4BEF-BFDF-29C42F48304A}" type="datetimeFigureOut">
               <a:rPr lang="en-US" smtClean="0"/>
               <a:pPr/>
-              <a:t>2/23/2020</a:t>
+              <a:t>11/14/2021</a:t>
             </a:fld>
             <a:endParaRPr lang="en-US"/>
           </a:p>
@@ -4728,7 +4752,7 @@
             <a:fld id="{47C9B81F-C347-4BEF-BFDF-29C42F48304A}" type="datetimeFigureOut">
               <a:rPr lang="en-US" smtClean="0"/>
               <a:pPr/>
-              <a:t>2/23/2020</a:t>
+              <a:t>11/14/2021</a:t>
             </a:fld>
             <a:endParaRPr lang="en-US" dirty="0">
               <a:solidFill>
@@ -7831,68 +7855,56 @@
             </a:pPr>
             <a:r>
               <a:rPr lang="es-ES" dirty="0"/>
-              <a:t>Por ejemplo: Nueva aplicación que gestione una lista de longitud variable de registros con NIF, nombre, apellidos y edad</a:t>
-            </a:r>
-          </a:p>
-          <a:p>
-            <a:pPr marL="361950" lvl="1" indent="0">
+              <a:t>Por ejemplo:</a:t>
+            </a:r>
+          </a:p>
+          <a:p>
+            <a:pPr marL="704850" lvl="1" indent="-342900">
               <a:spcBef>
-                <a:spcPts val="0"/>
+                <a:spcPts val="1200"/>
               </a:spcBef>
               <a:spcAft>
                 <a:spcPts val="600"/>
               </a:spcAft>
-              <a:buNone/>
+              <a:buFontTx/>
+              <a:buChar char="-"/>
             </a:pPr>
             <a:r>
               <a:rPr lang="es-ES" dirty="0"/>
-              <a:t>Partiremos de los módulos </a:t>
-            </a:r>
-            <a:r>
-              <a:rPr lang="es-ES" dirty="0">
-                <a:latin typeface="Consolas" pitchFamily="49" charset="0"/>
-                <a:cs typeface="Consolas" pitchFamily="49" charset="0"/>
-              </a:rPr>
-              <a:t>registro</a:t>
-            </a:r>
-            <a:r>
-              <a:rPr lang="es-ES" dirty="0"/>
-              <a:t> y </a:t>
-            </a:r>
-            <a:r>
-              <a:rPr lang="es-ES" dirty="0">
-                <a:latin typeface="Consolas" pitchFamily="49" charset="0"/>
-                <a:cs typeface="Consolas" pitchFamily="49" charset="0"/>
-              </a:rPr>
-              <a:t>lista</a:t>
-            </a:r>
-            <a:r>
-              <a:rPr lang="es-ES" dirty="0"/>
-              <a:t> existentes</a:t>
-            </a:r>
-          </a:p>
-          <a:p>
-            <a:pPr marL="361950" lvl="1" indent="0">
+              <a:t>Cálculo de NIF</a:t>
+            </a:r>
+          </a:p>
+          <a:p>
+            <a:pPr marL="704850" lvl="1" indent="-342900">
               <a:spcBef>
-                <a:spcPts val="0"/>
+                <a:spcPts val="1200"/>
               </a:spcBef>
               <a:spcAft>
                 <a:spcPts val="600"/>
               </a:spcAft>
-              <a:buNone/>
+              <a:buFontTx/>
+              <a:buChar char="-"/>
             </a:pPr>
             <a:r>
               <a:rPr lang="es-ES" dirty="0"/>
-              <a:t>Las modificaciones básicamente afectarán al módulo </a:t>
-            </a:r>
-            <a:r>
-              <a:rPr lang="es-ES" dirty="0">
-                <a:latin typeface="Consolas" pitchFamily="49" charset="0"/>
-                <a:cs typeface="Consolas" pitchFamily="49" charset="0"/>
-              </a:rPr>
-              <a:t>registro</a:t>
-            </a:r>
-            <a:endParaRPr lang="es-ES" dirty="0"/>
+              <a:t>Validez de IBAN</a:t>
+            </a:r>
+          </a:p>
+          <a:p>
+            <a:pPr marL="704850" lvl="1" indent="-342900">
+              <a:spcBef>
+                <a:spcPts val="1200"/>
+              </a:spcBef>
+              <a:spcAft>
+                <a:spcPts val="600"/>
+              </a:spcAft>
+              <a:buFontTx/>
+              <a:buChar char="-"/>
+            </a:pPr>
+            <a:r>
+              <a:rPr lang="es-ES" dirty="0"/>
+              <a:t>Validez email, teléfono, móvil, etc.</a:t>
+            </a:r>
           </a:p>
           <a:p>
             <a:pPr marL="361950" lvl="1" indent="0">
@@ -8220,7 +8232,7 @@
                             </p:stCondLst>
                             <p:childTnLst>
                               <p:par>
-                                <p:cTn id="23" presetID="22" presetClass="entr" presetSubtype="8" fill="hold" nodeType="clickEffect">
+                                <p:cTn id="23" presetID="22" presetClass="entr" presetSubtype="1" fill="hold" nodeType="clickEffect">
                                   <p:stCondLst>
                                     <p:cond delay="0"/>
                                   </p:stCondLst>
@@ -8247,7 +8259,7 @@
                                         <p:strVal val="visible"/>
                                       </p:to>
                                     </p:set>
-                                    <p:animEffect transition="in" filter="wipe(left)">
+                                    <p:animEffect transition="in" filter="wipe(up)">
                                       <p:cBhvr>
                                         <p:cTn id="25" dur="1000"/>
                                         <p:tgtEl>
@@ -8265,21 +8277,30 @@
                             </p:childTnLst>
                           </p:cTn>
                         </p:par>
+                      </p:childTnLst>
+                    </p:cTn>
+                  </p:par>
+                  <p:par>
+                    <p:cTn id="26" fill="hold">
+                      <p:stCondLst>
+                        <p:cond delay="indefinite"/>
+                      </p:stCondLst>
+                      <p:childTnLst>
                         <p:par>
-                          <p:cTn id="26" fill="hold">
+                          <p:cTn id="27" fill="hold">
                             <p:stCondLst>
-                              <p:cond delay="1000"/>
+                              <p:cond delay="0"/>
                             </p:stCondLst>
                             <p:childTnLst>
                               <p:par>
-                                <p:cTn id="27" presetID="22" presetClass="entr" presetSubtype="8" fill="hold" nodeType="afterEffect">
+                                <p:cTn id="28" presetID="22" presetClass="entr" presetSubtype="1" fill="hold" nodeType="clickEffect">
                                   <p:stCondLst>
                                     <p:cond delay="0"/>
                                   </p:stCondLst>
                                   <p:childTnLst>
                                     <p:set>
                                       <p:cBhvr>
-                                        <p:cTn id="28" dur="1" fill="hold">
+                                        <p:cTn id="29" dur="1" fill="hold">
                                           <p:stCondLst>
                                             <p:cond delay="0"/>
                                           </p:stCondLst>
@@ -8299,13 +8320,74 @@
                                         <p:strVal val="visible"/>
                                       </p:to>
                                     </p:set>
-                                    <p:animEffect transition="in" filter="wipe(left)">
+                                    <p:animEffect transition="in" filter="wipe(up)">
                                       <p:cBhvr>
-                                        <p:cTn id="29" dur="1000"/>
+                                        <p:cTn id="30" dur="1000"/>
                                         <p:tgtEl>
                                           <p:spTgt spid="3">
                                             <p:txEl>
                                               <p:pRg st="6" end="6"/>
+                                            </p:txEl>
+                                          </p:spTgt>
+                                        </p:tgtEl>
+                                      </p:cBhvr>
+                                    </p:animEffect>
+                                  </p:childTnLst>
+                                </p:cTn>
+                              </p:par>
+                            </p:childTnLst>
+                          </p:cTn>
+                        </p:par>
+                      </p:childTnLst>
+                    </p:cTn>
+                  </p:par>
+                  <p:par>
+                    <p:cTn id="31" fill="hold">
+                      <p:stCondLst>
+                        <p:cond delay="indefinite"/>
+                      </p:stCondLst>
+                      <p:childTnLst>
+                        <p:par>
+                          <p:cTn id="32" fill="hold">
+                            <p:stCondLst>
+                              <p:cond delay="0"/>
+                            </p:stCondLst>
+                            <p:childTnLst>
+                              <p:par>
+                                <p:cTn id="33" presetID="22" presetClass="entr" presetSubtype="1" fill="hold" nodeType="clickEffect">
+                                  <p:stCondLst>
+                                    <p:cond delay="0"/>
+                                  </p:stCondLst>
+                                  <p:childTnLst>
+                                    <p:set>
+                                      <p:cBhvr>
+                                        <p:cTn id="34" dur="1" fill="hold">
+                                          <p:stCondLst>
+                                            <p:cond delay="0"/>
+                                          </p:stCondLst>
+                                        </p:cTn>
+                                        <p:tgtEl>
+                                          <p:spTgt spid="3">
+                                            <p:txEl>
+                                              <p:pRg st="7" end="7"/>
+                                            </p:txEl>
+                                          </p:spTgt>
+                                        </p:tgtEl>
+                                        <p:attrNameLst>
+                                          <p:attrName>style.visibility</p:attrName>
+                                        </p:attrNameLst>
+                                      </p:cBhvr>
+                                      <p:to>
+                                        <p:strVal val="visible"/>
+                                      </p:to>
+                                    </p:set>
+                                    <p:animEffect transition="in" filter="wipe(up)">
+                                      <p:cBhvr>
+                                        <p:cTn id="35" dur="1000"/>
+                                        <p:tgtEl>
+                                          <p:spTgt spid="3">
+                                            <p:txEl>
+                                              <p:pRg st="7" end="7"/>
                                             </p:txEl>
                                           </p:spTgt>
                                         </p:tgtEl>

</xml_diff>